<commit_message>
Added comments and deleted any cells on the plot files. Edited comments to the powerpoint.
</commit_message>
<xml_diff>
--- a/Project1Master.pptx
+++ b/Project1Master.pptx
@@ -5,7 +5,7 @@
     <p:sldMasterId id="2147483648" r:id="rId1"/>
   </p:sldMasterIdLst>
   <p:notesMasterIdLst>
-    <p:notesMasterId r:id="rId26"/>
+    <p:notesMasterId r:id="rId25"/>
   </p:notesMasterIdLst>
   <p:sldIdLst>
     <p:sldId id="256" r:id="rId2"/>
@@ -16,22 +16,21 @@
     <p:sldId id="264" r:id="rId7"/>
     <p:sldId id="260" r:id="rId8"/>
     <p:sldId id="268" r:id="rId9"/>
-    <p:sldId id="269" r:id="rId10"/>
-    <p:sldId id="270" r:id="rId11"/>
-    <p:sldId id="267" r:id="rId12"/>
-    <p:sldId id="265" r:id="rId13"/>
-    <p:sldId id="266" r:id="rId14"/>
-    <p:sldId id="271" r:id="rId15"/>
-    <p:sldId id="272" r:id="rId16"/>
-    <p:sldId id="273" r:id="rId17"/>
-    <p:sldId id="274" r:id="rId18"/>
-    <p:sldId id="275" r:id="rId19"/>
-    <p:sldId id="261" r:id="rId20"/>
-    <p:sldId id="277" r:id="rId21"/>
-    <p:sldId id="278" r:id="rId22"/>
-    <p:sldId id="279" r:id="rId23"/>
-    <p:sldId id="280" r:id="rId24"/>
-    <p:sldId id="281" r:id="rId25"/>
+    <p:sldId id="270" r:id="rId10"/>
+    <p:sldId id="267" r:id="rId11"/>
+    <p:sldId id="265" r:id="rId12"/>
+    <p:sldId id="266" r:id="rId13"/>
+    <p:sldId id="271" r:id="rId14"/>
+    <p:sldId id="272" r:id="rId15"/>
+    <p:sldId id="273" r:id="rId16"/>
+    <p:sldId id="274" r:id="rId17"/>
+    <p:sldId id="275" r:id="rId18"/>
+    <p:sldId id="261" r:id="rId19"/>
+    <p:sldId id="277" r:id="rId20"/>
+    <p:sldId id="278" r:id="rId21"/>
+    <p:sldId id="279" r:id="rId22"/>
+    <p:sldId id="280" r:id="rId23"/>
+    <p:sldId id="281" r:id="rId24"/>
   </p:sldIdLst>
   <p:sldSz cx="12192000" cy="6858000"/>
   <p:notesSz cx="6858000" cy="9144000"/>
@@ -187,7 +186,7 @@
             </a:lvl1pPr>
           </a:lstStyle>
           <a:p>
-            <a:endParaRPr lang="en-US"/>
+            <a:endParaRPr lang="en-US" dirty="0"/>
           </a:p>
         </p:txBody>
       </p:sp>
@@ -220,9 +219,9 @@
           <a:p>
             <a:fld id="{E0757C17-B58F-49FA-AB40-29F5001C03D3}" type="datetimeFigureOut">
               <a:rPr lang="en-US" smtClean="0"/>
-              <a:t>6/13/2018</a:t>
+              <a:t>6/14/2018</a:t>
             </a:fld>
-            <a:endParaRPr lang="en-US"/>
+            <a:endParaRPr lang="en-US" dirty="0"/>
           </a:p>
         </p:txBody>
       </p:sp>
@@ -255,7 +254,7 @@
           <a:bodyPr vert="horz" lIns="91440" tIns="45720" rIns="91440" bIns="45720" rtlCol="0" anchor="ctr"/>
           <a:lstStyle/>
           <a:p>
-            <a:endParaRPr lang="en-US"/>
+            <a:endParaRPr lang="en-US" dirty="0"/>
           </a:p>
         </p:txBody>
       </p:sp>
@@ -345,7 +344,7 @@
             </a:lvl1pPr>
           </a:lstStyle>
           <a:p>
-            <a:endParaRPr lang="en-US"/>
+            <a:endParaRPr lang="en-US" dirty="0"/>
           </a:p>
         </p:txBody>
       </p:sp>
@@ -380,7 +379,7 @@
               <a:rPr lang="en-US" smtClean="0"/>
               <a:t>‹#›</a:t>
             </a:fld>
-            <a:endParaRPr lang="en-US"/>
+            <a:endParaRPr lang="en-US" dirty="0"/>
           </a:p>
         </p:txBody>
       </p:sp>
@@ -554,7 +553,7 @@
               <a:rPr lang="en-US" smtClean="0"/>
               <a:t>1</a:t>
             </a:fld>
-            <a:endParaRPr lang="en-US"/>
+            <a:endParaRPr lang="en-US" dirty="0"/>
           </a:p>
         </p:txBody>
       </p:sp>
@@ -641,7 +640,7 @@
               <a:rPr lang="en-US" smtClean="0"/>
               <a:t>2</a:t>
             </a:fld>
-            <a:endParaRPr lang="en-US"/>
+            <a:endParaRPr lang="en-US" dirty="0"/>
           </a:p>
         </p:txBody>
       </p:sp>
@@ -728,7 +727,7 @@
               <a:rPr lang="en-US" smtClean="0"/>
               <a:t>3</a:t>
             </a:fld>
-            <a:endParaRPr lang="en-US"/>
+            <a:endParaRPr lang="en-US" dirty="0"/>
           </a:p>
         </p:txBody>
       </p:sp>
@@ -815,7 +814,7 @@
               <a:rPr lang="en-US" smtClean="0"/>
               <a:t>6</a:t>
             </a:fld>
-            <a:endParaRPr lang="en-US"/>
+            <a:endParaRPr lang="en-US" dirty="0"/>
           </a:p>
         </p:txBody>
       </p:sp>
@@ -897,9 +896,9 @@
           <a:p>
             <a:fld id="{118452FE-E218-4C8F-AC38-718F30F6917B}" type="slidenum">
               <a:rPr lang="en-US" smtClean="0"/>
-              <a:t>14</a:t>
+              <a:t>13</a:t>
             </a:fld>
-            <a:endParaRPr lang="en-US"/>
+            <a:endParaRPr lang="en-US" dirty="0"/>
           </a:p>
         </p:txBody>
       </p:sp>
@@ -987,9 +986,9 @@
           <a:p>
             <a:fld id="{118452FE-E218-4C8F-AC38-718F30F6917B}" type="slidenum">
               <a:rPr lang="en-US" smtClean="0"/>
-              <a:t>19</a:t>
+              <a:t>18</a:t>
             </a:fld>
-            <a:endParaRPr lang="en-US"/>
+            <a:endParaRPr lang="en-US" dirty="0"/>
           </a:p>
         </p:txBody>
       </p:sp>
@@ -1106,9 +1105,9 @@
           <a:p>
             <a:fld id="{118452FE-E218-4C8F-AC38-718F30F6917B}" type="slidenum">
               <a:rPr lang="en-US" smtClean="0"/>
-              <a:t>20</a:t>
+              <a:t>19</a:t>
             </a:fld>
-            <a:endParaRPr lang="en-US"/>
+            <a:endParaRPr lang="en-US" dirty="0"/>
           </a:p>
         </p:txBody>
       </p:sp>
@@ -1219,9 +1218,9 @@
           <a:p>
             <a:fld id="{118452FE-E218-4C8F-AC38-718F30F6917B}" type="slidenum">
               <a:rPr lang="en-US" smtClean="0"/>
-              <a:t>21</a:t>
+              <a:t>20</a:t>
             </a:fld>
-            <a:endParaRPr lang="en-US"/>
+            <a:endParaRPr lang="en-US" dirty="0"/>
           </a:p>
         </p:txBody>
       </p:sp>
@@ -1349,9 +1348,9 @@
           <a:p>
             <a:fld id="{118452FE-E218-4C8F-AC38-718F30F6917B}" type="slidenum">
               <a:rPr lang="en-US" smtClean="0"/>
-              <a:t>22</a:t>
+              <a:t>21</a:t>
             </a:fld>
-            <a:endParaRPr lang="en-US"/>
+            <a:endParaRPr lang="en-US" dirty="0"/>
           </a:p>
         </p:txBody>
       </p:sp>
@@ -1570,7 +1569,7 @@
           <a:lstStyle/>
           <a:p>
             <a:pPr algn="ctr"/>
-            <a:endParaRPr lang="en-US"/>
+            <a:endParaRPr lang="en-US" dirty="0"/>
           </a:p>
         </p:txBody>
       </p:sp>
@@ -1622,7 +1621,7 @@
           <a:lstStyle/>
           <a:p>
             <a:pPr algn="ctr"/>
-            <a:endParaRPr lang="en-US"/>
+            <a:endParaRPr lang="en-US" dirty="0"/>
           </a:p>
         </p:txBody>
       </p:sp>
@@ -1666,7 +1665,7 @@
           <a:lstStyle/>
           <a:p>
             <a:pPr algn="ctr"/>
-            <a:endParaRPr lang="en-US"/>
+            <a:endParaRPr lang="en-US" dirty="0"/>
           </a:p>
         </p:txBody>
       </p:sp>
@@ -1863,7 +1862,7 @@
           <a:lstStyle/>
           <a:p>
             <a:pPr algn="ctr"/>
-            <a:endParaRPr lang="en-US"/>
+            <a:endParaRPr lang="en-US" dirty="0"/>
           </a:p>
         </p:txBody>
       </p:sp>
@@ -1915,7 +1914,7 @@
           <a:lstStyle/>
           <a:p>
             <a:pPr algn="ctr"/>
-            <a:endParaRPr lang="en-US"/>
+            <a:endParaRPr lang="en-US" dirty="0"/>
           </a:p>
         </p:txBody>
       </p:sp>
@@ -2179,7 +2178,7 @@
           <a:lstStyle/>
           <a:p>
             <a:pPr algn="ctr"/>
-            <a:endParaRPr lang="en-US"/>
+            <a:endParaRPr lang="en-US" dirty="0"/>
           </a:p>
         </p:txBody>
       </p:sp>
@@ -2231,7 +2230,7 @@
           <a:lstStyle/>
           <a:p>
             <a:pPr algn="ctr"/>
-            <a:endParaRPr lang="en-US"/>
+            <a:endParaRPr lang="en-US" dirty="0"/>
           </a:p>
         </p:txBody>
       </p:sp>
@@ -2456,7 +2455,7 @@
             </a:lvl9pPr>
           </a:lstStyle>
           <a:p>
-            <a:endParaRPr lang="en-US"/>
+            <a:endParaRPr lang="en-US" dirty="0"/>
           </a:p>
         </p:txBody>
       </p:sp>
@@ -2508,7 +2507,7 @@
           <a:lstStyle/>
           <a:p>
             <a:pPr algn="ctr"/>
-            <a:endParaRPr lang="en-US"/>
+            <a:endParaRPr lang="en-US" dirty="0"/>
           </a:p>
         </p:txBody>
       </p:sp>
@@ -2560,7 +2559,7 @@
           <a:lstStyle/>
           <a:p>
             <a:pPr algn="ctr"/>
-            <a:endParaRPr lang="en-US"/>
+            <a:endParaRPr lang="en-US" dirty="0"/>
           </a:p>
         </p:txBody>
       </p:sp>
@@ -2694,7 +2693,7 @@
             </a:lvl9pPr>
           </a:lstStyle>
           <a:p>
-            <a:endParaRPr lang="en-US"/>
+            <a:endParaRPr lang="en-US" dirty="0"/>
           </a:p>
         </p:txBody>
       </p:sp>
@@ -3937,15 +3936,7 @@
           <a:p>
             <a:r>
               <a:rPr lang="en-US" dirty="0"/>
-              <a:t>Alex </a:t>
-            </a:r>
-            <a:r>
-              <a:rPr lang="en-US" dirty="0" err="1"/>
-              <a:t>Schackmuth</a:t>
-            </a:r>
-            <a:r>
-              <a:rPr lang="en-US" dirty="0"/>
-              <a:t> </a:t>
+              <a:t>Alex Schackmuth </a:t>
             </a:r>
           </a:p>
           <a:p>
@@ -3972,6 +3963,14 @@
 <file path=ppt/slides/slide10.xml><?xml version="1.0" encoding="utf-8"?>
 <p:sld xmlns:a="http://schemas.openxmlformats.org/drawingml/2006/main" xmlns:r="http://schemas.openxmlformats.org/officeDocument/2006/relationships" xmlns:p="http://schemas.openxmlformats.org/presentationml/2006/main">
   <p:cSld>
+    <p:bg>
+      <p:bgPr>
+        <a:solidFill>
+          <a:schemeClr val="bg1"/>
+        </a:solidFill>
+        <a:effectLst/>
+      </p:bgPr>
+    </p:bg>
     <p:spTree>
       <p:nvGrpSpPr>
         <p:cNvPr id="1" name=""/>
@@ -3986,75 +3985,12 @@
           <a:chExt cx="0" cy="0"/>
         </a:xfrm>
       </p:grpSpPr>
-      <p:sp>
-        <p:nvSpPr>
-          <p:cNvPr id="15" name="Title 14">
-            <a:extLst>
-              <a:ext uri="{FF2B5EF4-FFF2-40B4-BE49-F238E27FC236}">
-                <a16:creationId xmlns:a16="http://schemas.microsoft.com/office/drawing/2014/main" id="{8315A751-6BA8-4C20-94B6-2411FD3D106B}"/>
-              </a:ext>
-            </a:extLst>
-          </p:cNvPr>
-          <p:cNvSpPr>
-            <a:spLocks noGrp="1"/>
-          </p:cNvSpPr>
-          <p:nvPr>
-            <p:ph type="title"/>
-          </p:nvPr>
-        </p:nvSpPr>
-        <p:spPr/>
-        <p:txBody>
-          <a:bodyPr/>
-          <a:lstStyle/>
-          <a:p>
-            <a:r>
-              <a:rPr lang="en-US" dirty="0"/>
-              <a:t>Gender</a:t>
-            </a:r>
-          </a:p>
-        </p:txBody>
-      </p:sp>
-      <p:sp>
-        <p:nvSpPr>
-          <p:cNvPr id="17" name="Content Placeholder 16">
-            <a:extLst>
-              <a:ext uri="{FF2B5EF4-FFF2-40B4-BE49-F238E27FC236}">
-                <a16:creationId xmlns:a16="http://schemas.microsoft.com/office/drawing/2014/main" id="{286A55AE-A257-4DC0-BC79-2EEC6B244ED3}"/>
-              </a:ext>
-            </a:extLst>
-          </p:cNvPr>
-          <p:cNvSpPr>
-            <a:spLocks noGrp="1"/>
-          </p:cNvSpPr>
-          <p:nvPr>
-            <p:ph sz="half" idx="2"/>
-          </p:nvPr>
-        </p:nvSpPr>
-        <p:spPr>
-          <a:xfrm>
-            <a:off x="7605616" y="1250576"/>
-            <a:ext cx="3890348" cy="5122928"/>
-          </a:xfrm>
-        </p:spPr>
-        <p:txBody>
-          <a:bodyPr>
-            <a:normAutofit/>
-          </a:bodyPr>
-          <a:lstStyle/>
-          <a:p>
-            <a:r>
-              <a:rPr lang="en-US" sz="2000" dirty="0"/>
-              <a:t>Portion similar</a:t>
-            </a:r>
-          </a:p>
-        </p:txBody>
-      </p:sp>
       <p:pic>
         <p:nvPicPr>
-          <p:cNvPr id="6" name="Picture 5">
-            <a:extLst>
-              <a:ext uri="{FF2B5EF4-FFF2-40B4-BE49-F238E27FC236}">
-                <a16:creationId xmlns:a16="http://schemas.microsoft.com/office/drawing/2014/main" id="{B0454BE3-76B4-4EFE-8D6F-A6536E75BD29}"/>
+          <p:cNvPr id="5" name="Picture 4" descr="A screenshot of a cell phone&#10;&#10;Description generated with high confidence">
+            <a:extLst>
+              <a:ext uri="{FF2B5EF4-FFF2-40B4-BE49-F238E27FC236}">
+                <a16:creationId xmlns:a16="http://schemas.microsoft.com/office/drawing/2014/main" id="{B6836962-E780-4218-98E2-DD8C40E9BB55}"/>
               </a:ext>
             </a:extLst>
           </p:cNvPr>
@@ -4063,7 +3999,7 @@
           </p:cNvPicPr>
           <p:nvPr/>
         </p:nvPicPr>
-        <p:blipFill>
+        <p:blipFill rotWithShape="1">
           <a:blip r:embed="rId2">
             <a:extLst>
               <a:ext uri="{28A0092B-C50C-407E-A947-70E740481C1C}">
@@ -4071,38 +4007,126 @@
               </a:ext>
             </a:extLst>
           </a:blip>
-          <a:stretch>
-            <a:fillRect/>
-          </a:stretch>
+          <a:srcRect r="804" b="1"/>
+          <a:stretch/>
         </p:blipFill>
         <p:spPr>
           <a:xfrm>
-            <a:off x="686201" y="1250576"/>
-            <a:ext cx="6400800" cy="4686301"/>
+            <a:off x="411326" y="346968"/>
+            <a:ext cx="6903107" cy="5567173"/>
           </a:xfrm>
           <a:prstGeom prst="rect">
             <a:avLst/>
           </a:prstGeom>
-          <a:ln w="12700">
-            <a:solidFill>
-              <a:schemeClr val="bg1">
-                <a:lumMod val="50000"/>
-              </a:schemeClr>
-            </a:solidFill>
-            <a:prstDash val="sysDot"/>
-          </a:ln>
+          <a:effectLst/>
         </p:spPr>
       </p:pic>
+      <p:sp>
+        <p:nvSpPr>
+          <p:cNvPr id="2" name="Title 1">
+            <a:extLst>
+              <a:ext uri="{FF2B5EF4-FFF2-40B4-BE49-F238E27FC236}">
+                <a16:creationId xmlns:a16="http://schemas.microsoft.com/office/drawing/2014/main" id="{F5E0414B-A4C6-4D36-A403-2AEB39104C15}"/>
+              </a:ext>
+            </a:extLst>
+          </p:cNvPr>
+          <p:cNvSpPr>
+            <a:spLocks noGrp="1"/>
+          </p:cNvSpPr>
+          <p:nvPr>
+            <p:ph type="title"/>
+          </p:nvPr>
+        </p:nvSpPr>
+        <p:spPr>
+          <a:xfrm>
+            <a:off x="575286" y="-217628"/>
+            <a:ext cx="3667039" cy="1676603"/>
+          </a:xfrm>
+        </p:spPr>
+        <p:txBody>
+          <a:bodyPr>
+            <a:normAutofit/>
+          </a:bodyPr>
+          <a:lstStyle/>
+          <a:p>
+            <a:r>
+              <a:rPr lang="en-US" dirty="0"/>
+              <a:t>Race</a:t>
+            </a:r>
+          </a:p>
+        </p:txBody>
+      </p:sp>
+      <p:sp>
+        <p:nvSpPr>
+          <p:cNvPr id="3" name="Content Placeholder 2">
+            <a:extLst>
+              <a:ext uri="{FF2B5EF4-FFF2-40B4-BE49-F238E27FC236}">
+                <a16:creationId xmlns:a16="http://schemas.microsoft.com/office/drawing/2014/main" id="{95F02679-E861-48E0-A4A4-5C6432B35A18}"/>
+              </a:ext>
+            </a:extLst>
+          </p:cNvPr>
+          <p:cNvSpPr>
+            <a:spLocks noGrp="1"/>
+          </p:cNvSpPr>
+          <p:nvPr>
+            <p:ph idx="1"/>
+          </p:nvPr>
+        </p:nvSpPr>
+        <p:spPr>
+          <a:xfrm>
+            <a:off x="7394011" y="1109994"/>
+            <a:ext cx="3667037" cy="3785419"/>
+          </a:xfrm>
+        </p:spPr>
+        <p:txBody>
+          <a:bodyPr>
+            <a:normAutofit/>
+          </a:bodyPr>
+          <a:lstStyle/>
+          <a:p>
+            <a:pPr marL="0" indent="0">
+              <a:buNone/>
+            </a:pPr>
+            <a:r>
+              <a:rPr lang="en-US" sz="1700" b="1" dirty="0"/>
+              <a:t>What groups were surveyed to determine Health state?</a:t>
+            </a:r>
+          </a:p>
+          <a:p>
+            <a:pPr marL="0" indent="0">
+              <a:buNone/>
+            </a:pPr>
+            <a:endParaRPr lang="en-US" sz="1700" dirty="0"/>
+          </a:p>
+          <a:p>
+            <a:pPr marL="0" indent="0">
+              <a:buNone/>
+            </a:pPr>
+            <a:r>
+              <a:rPr lang="en-US" sz="1700" dirty="0"/>
+              <a:t>Our analysis based on Race, we found that White Non-Hispanic are in Excellent to Good Health, whereas Black and Hispanics were about average of having Good to Fair Health.</a:t>
+            </a:r>
+          </a:p>
+        </p:txBody>
+      </p:sp>
     </p:spTree>
     <p:extLst>
       <p:ext uri="{BB962C8B-B14F-4D97-AF65-F5344CB8AC3E}">
-        <p14:creationId xmlns:p14="http://schemas.microsoft.com/office/powerpoint/2010/main" val="1192343992"/>
+        <p14:creationId xmlns:p14="http://schemas.microsoft.com/office/powerpoint/2010/main" val="944775893"/>
       </p:ext>
     </p:extLst>
   </p:cSld>
   <p:clrMapOvr>
     <a:masterClrMapping/>
   </p:clrMapOvr>
+  <mc:AlternateContent xmlns:mc="http://schemas.openxmlformats.org/markup-compatibility/2006" xmlns:p14="http://schemas.microsoft.com/office/powerpoint/2010/main">
+    <mc:Choice Requires="p14">
+      <p:transition p14:dur="0" advClick="0"/>
+    </mc:Choice>
+    <mc:Fallback xmlns="">
+      <p:transition advClick="0"/>
+    </mc:Fallback>
+  </mc:AlternateContent>
 </p:sld>
 </file>
 
@@ -4136,7 +4160,7 @@
           <p:cNvPr id="5" name="Picture 4" descr="A screenshot of a cell phone&#10;&#10;Description generated with high confidence">
             <a:extLst>
               <a:ext uri="{FF2B5EF4-FFF2-40B4-BE49-F238E27FC236}">
-                <a16:creationId xmlns:a16="http://schemas.microsoft.com/office/drawing/2014/main" id="{B6836962-E780-4218-98E2-DD8C40E9BB55}"/>
+                <a16:creationId xmlns:a16="http://schemas.microsoft.com/office/drawing/2014/main" id="{5C1D28A8-F3BE-4158-9EBF-1B8165EC219B}"/>
               </a:ext>
             </a:extLst>
           </p:cNvPr>
@@ -4158,8 +4182,8 @@
         </p:blipFill>
         <p:spPr>
           <a:xfrm>
-            <a:off x="411326" y="346968"/>
-            <a:ext cx="6903107" cy="5567173"/>
+            <a:off x="590134" y="486896"/>
+            <a:ext cx="6815537" cy="5422951"/>
           </a:xfrm>
           <a:prstGeom prst="rect">
             <a:avLst/>
@@ -4185,7 +4209,7 @@
         </p:nvSpPr>
         <p:spPr>
           <a:xfrm>
-            <a:off x="575286" y="-217628"/>
+            <a:off x="471418" y="0"/>
             <a:ext cx="3667039" cy="1676603"/>
           </a:xfrm>
         </p:spPr>
@@ -4197,7 +4221,7 @@
           <a:p>
             <a:r>
               <a:rPr lang="en-US" dirty="0"/>
-              <a:t>Race</a:t>
+              <a:t>Environment</a:t>
             </a:r>
           </a:p>
         </p:txBody>
@@ -4220,7 +4244,7 @@
         </p:nvSpPr>
         <p:spPr>
           <a:xfrm>
-            <a:off x="7394011" y="1109994"/>
+            <a:off x="7405671" y="1180333"/>
             <a:ext cx="3667037" cy="3785419"/>
           </a:xfrm>
         </p:spPr>
@@ -4235,7 +4259,7 @@
             </a:pPr>
             <a:r>
               <a:rPr lang="en-US" sz="1700" b="1" dirty="0"/>
-              <a:t>What groups were surveyed to determine Health state?</a:t>
+              <a:t>How does the environment influence Health state?</a:t>
             </a:r>
           </a:p>
           <a:p>
@@ -4250,7 +4274,22 @@
             </a:pPr>
             <a:r>
               <a:rPr lang="en-US" sz="1700" dirty="0"/>
-              <a:t>Our analysis based on Race, we found that White Non-Hispanic are in Excellent to Good Health, whereas Black and Hispanics were about average of having Good to Fair Health.</a:t>
+              <a:t>Based on the Bar Chart of the General Health broken down by the Environment, our analysis shows individuals above the 20% Poverty Line are in Good Health.</a:t>
+            </a:r>
+          </a:p>
+          <a:p>
+            <a:pPr marL="0" indent="0">
+              <a:buNone/>
+            </a:pPr>
+            <a:endParaRPr lang="en-US" sz="1700" dirty="0"/>
+          </a:p>
+          <a:p>
+            <a:pPr marL="0" indent="0">
+              <a:buNone/>
+            </a:pPr>
+            <a:r>
+              <a:rPr lang="en-US" sz="1700" dirty="0"/>
+              <a:t>What we found interesting is that the individuals below the 10% Poverty Line had a count between 400 – 600 of Excellent to Very Good Health. </a:t>
             </a:r>
           </a:p>
         </p:txBody>
@@ -4258,21 +4297,13 @@
     </p:spTree>
     <p:extLst>
       <p:ext uri="{BB962C8B-B14F-4D97-AF65-F5344CB8AC3E}">
-        <p14:creationId xmlns:p14="http://schemas.microsoft.com/office/powerpoint/2010/main" val="944775893"/>
+        <p14:creationId xmlns:p14="http://schemas.microsoft.com/office/powerpoint/2010/main" val="4010338325"/>
       </p:ext>
     </p:extLst>
   </p:cSld>
   <p:clrMapOvr>
     <a:masterClrMapping/>
   </p:clrMapOvr>
-  <mc:AlternateContent xmlns:mc="http://schemas.openxmlformats.org/markup-compatibility/2006">
-    <mc:Choice xmlns:p14="http://schemas.microsoft.com/office/powerpoint/2010/main" Requires="p14">
-      <p:transition p14:dur="0" advClick="0"/>
-    </mc:Choice>
-    <mc:Fallback>
-      <p:transition advClick="0"/>
-    </mc:Fallback>
-  </mc:AlternateContent>
 </p:sld>
 </file>
 
@@ -4303,183 +4334,6 @@
       </p:grpSpPr>
       <p:pic>
         <p:nvPicPr>
-          <p:cNvPr id="5" name="Picture 4" descr="A screenshot of a cell phone&#10;&#10;Description generated with high confidence">
-            <a:extLst>
-              <a:ext uri="{FF2B5EF4-FFF2-40B4-BE49-F238E27FC236}">
-                <a16:creationId xmlns:a16="http://schemas.microsoft.com/office/drawing/2014/main" id="{5C1D28A8-F3BE-4158-9EBF-1B8165EC219B}"/>
-              </a:ext>
-            </a:extLst>
-          </p:cNvPr>
-          <p:cNvPicPr>
-            <a:picLocks noChangeAspect="1"/>
-          </p:cNvPicPr>
-          <p:nvPr/>
-        </p:nvPicPr>
-        <p:blipFill rotWithShape="1">
-          <a:blip r:embed="rId2">
-            <a:extLst>
-              <a:ext uri="{28A0092B-C50C-407E-A947-70E740481C1C}">
-                <a14:useLocalDpi xmlns:a14="http://schemas.microsoft.com/office/drawing/2010/main" val="0"/>
-              </a:ext>
-            </a:extLst>
-          </a:blip>
-          <a:srcRect r="804" b="1"/>
-          <a:stretch/>
-        </p:blipFill>
-        <p:spPr>
-          <a:xfrm>
-            <a:off x="590134" y="486896"/>
-            <a:ext cx="6815537" cy="5422951"/>
-          </a:xfrm>
-          <a:prstGeom prst="rect">
-            <a:avLst/>
-          </a:prstGeom>
-          <a:effectLst/>
-        </p:spPr>
-      </p:pic>
-      <p:sp>
-        <p:nvSpPr>
-          <p:cNvPr id="2" name="Title 1">
-            <a:extLst>
-              <a:ext uri="{FF2B5EF4-FFF2-40B4-BE49-F238E27FC236}">
-                <a16:creationId xmlns:a16="http://schemas.microsoft.com/office/drawing/2014/main" id="{F5E0414B-A4C6-4D36-A403-2AEB39104C15}"/>
-              </a:ext>
-            </a:extLst>
-          </p:cNvPr>
-          <p:cNvSpPr>
-            <a:spLocks noGrp="1"/>
-          </p:cNvSpPr>
-          <p:nvPr>
-            <p:ph type="title"/>
-          </p:nvPr>
-        </p:nvSpPr>
-        <p:spPr>
-          <a:xfrm>
-            <a:off x="471418" y="0"/>
-            <a:ext cx="3667039" cy="1676603"/>
-          </a:xfrm>
-        </p:spPr>
-        <p:txBody>
-          <a:bodyPr>
-            <a:normAutofit/>
-          </a:bodyPr>
-          <a:lstStyle/>
-          <a:p>
-            <a:r>
-              <a:rPr lang="en-US" dirty="0"/>
-              <a:t>Environment</a:t>
-            </a:r>
-          </a:p>
-        </p:txBody>
-      </p:sp>
-      <p:sp>
-        <p:nvSpPr>
-          <p:cNvPr id="3" name="Content Placeholder 2">
-            <a:extLst>
-              <a:ext uri="{FF2B5EF4-FFF2-40B4-BE49-F238E27FC236}">
-                <a16:creationId xmlns:a16="http://schemas.microsoft.com/office/drawing/2014/main" id="{95F02679-E861-48E0-A4A4-5C6432B35A18}"/>
-              </a:ext>
-            </a:extLst>
-          </p:cNvPr>
-          <p:cNvSpPr>
-            <a:spLocks noGrp="1"/>
-          </p:cNvSpPr>
-          <p:nvPr>
-            <p:ph idx="1"/>
-          </p:nvPr>
-        </p:nvSpPr>
-        <p:spPr>
-          <a:xfrm>
-            <a:off x="7405671" y="1180333"/>
-            <a:ext cx="3667037" cy="3785419"/>
-          </a:xfrm>
-        </p:spPr>
-        <p:txBody>
-          <a:bodyPr>
-            <a:normAutofit/>
-          </a:bodyPr>
-          <a:lstStyle/>
-          <a:p>
-            <a:pPr marL="0" indent="0">
-              <a:buNone/>
-            </a:pPr>
-            <a:r>
-              <a:rPr lang="en-US" sz="1700" b="1" dirty="0"/>
-              <a:t>How does the environment influence Health state?</a:t>
-            </a:r>
-          </a:p>
-          <a:p>
-            <a:pPr marL="0" indent="0">
-              <a:buNone/>
-            </a:pPr>
-            <a:endParaRPr lang="en-US" sz="1700" dirty="0"/>
-          </a:p>
-          <a:p>
-            <a:pPr marL="0" indent="0">
-              <a:buNone/>
-            </a:pPr>
-            <a:r>
-              <a:rPr lang="en-US" sz="1700" dirty="0"/>
-              <a:t>Based on the Bar Chart of the General Health broken down by the Environment, our analysis shows individuals above the 20% Poverty Line are in Good Health.</a:t>
-            </a:r>
-          </a:p>
-          <a:p>
-            <a:pPr marL="0" indent="0">
-              <a:buNone/>
-            </a:pPr>
-            <a:endParaRPr lang="en-US" sz="1700" dirty="0"/>
-          </a:p>
-          <a:p>
-            <a:pPr marL="0" indent="0">
-              <a:buNone/>
-            </a:pPr>
-            <a:r>
-              <a:rPr lang="en-US" sz="1700" dirty="0"/>
-              <a:t>What we found interesting is that the individuals below the 10% Poverty Line had a count between 400 – 600 of Excellent to Very Good Health. </a:t>
-            </a:r>
-          </a:p>
-        </p:txBody>
-      </p:sp>
-    </p:spTree>
-    <p:extLst>
-      <p:ext uri="{BB962C8B-B14F-4D97-AF65-F5344CB8AC3E}">
-        <p14:creationId xmlns:p14="http://schemas.microsoft.com/office/powerpoint/2010/main" val="4010338325"/>
-      </p:ext>
-    </p:extLst>
-  </p:cSld>
-  <p:clrMapOvr>
-    <a:masterClrMapping/>
-  </p:clrMapOvr>
-</p:sld>
-</file>
-
-<file path=ppt/slides/slide13.xml><?xml version="1.0" encoding="utf-8"?>
-<p:sld xmlns:a="http://schemas.openxmlformats.org/drawingml/2006/main" xmlns:r="http://schemas.openxmlformats.org/officeDocument/2006/relationships" xmlns:p="http://schemas.openxmlformats.org/presentationml/2006/main">
-  <p:cSld>
-    <p:bg>
-      <p:bgPr>
-        <a:solidFill>
-          <a:schemeClr val="bg1"/>
-        </a:solidFill>
-        <a:effectLst/>
-      </p:bgPr>
-    </p:bg>
-    <p:spTree>
-      <p:nvGrpSpPr>
-        <p:cNvPr id="1" name=""/>
-        <p:cNvGrpSpPr/>
-        <p:nvPr/>
-      </p:nvGrpSpPr>
-      <p:grpSpPr>
-        <a:xfrm>
-          <a:off x="0" y="0"/>
-          <a:ext cx="0" cy="0"/>
-          <a:chOff x="0" y="0"/>
-          <a:chExt cx="0" cy="0"/>
-        </a:xfrm>
-      </p:grpSpPr>
-      <p:pic>
-        <p:nvPicPr>
           <p:cNvPr id="6" name="Picture 5" descr="A screenshot of a cell phone&#10;&#10;Description generated with high confidence">
             <a:extLst>
               <a:ext uri="{FF2B5EF4-FFF2-40B4-BE49-F238E27FC236}">
@@ -4624,7 +4478,7 @@
 </p:sld>
 </file>
 
-<file path=ppt/slides/slide14.xml><?xml version="1.0" encoding="utf-8"?>
+<file path=ppt/slides/slide13.xml><?xml version="1.0" encoding="utf-8"?>
 <p:sld xmlns:a="http://schemas.openxmlformats.org/drawingml/2006/main" xmlns:r="http://schemas.openxmlformats.org/officeDocument/2006/relationships" xmlns:p="http://schemas.openxmlformats.org/presentationml/2006/main">
   <p:cSld>
     <p:spTree>
@@ -4747,7 +4601,7 @@
 </p:sld>
 </file>
 
-<file path=ppt/slides/slide15.xml><?xml version="1.0" encoding="utf-8"?>
+<file path=ppt/slides/slide14.xml><?xml version="1.0" encoding="utf-8"?>
 <p:sld xmlns:a="http://schemas.openxmlformats.org/drawingml/2006/main" xmlns:r="http://schemas.openxmlformats.org/officeDocument/2006/relationships" xmlns:p="http://schemas.openxmlformats.org/presentationml/2006/main">
   <p:cSld>
     <p:spTree>
@@ -4917,7 +4771,7 @@
 </p:sld>
 </file>
 
-<file path=ppt/slides/slide16.xml><?xml version="1.0" encoding="utf-8"?>
+<file path=ppt/slides/slide15.xml><?xml version="1.0" encoding="utf-8"?>
 <p:sld xmlns:a="http://schemas.openxmlformats.org/drawingml/2006/main" xmlns:r="http://schemas.openxmlformats.org/officeDocument/2006/relationships" xmlns:p="http://schemas.openxmlformats.org/presentationml/2006/main">
   <p:cSld>
     <p:spTree>
@@ -5025,7 +4879,7 @@
           <a:p>
             <a:r>
               <a:rPr lang="en-US" sz="2000" dirty="0"/>
-              <a:t>Portion of No are slightly larger with the Fair  and Poor groups</a:t>
+              <a:t>Portion of “No” are slightly larger with the Fair  and Poor groups</a:t>
             </a:r>
           </a:p>
         </p:txBody>
@@ -5087,7 +4941,7 @@
 </p:sld>
 </file>
 
-<file path=ppt/slides/slide17.xml><?xml version="1.0" encoding="utf-8"?>
+<file path=ppt/slides/slide16.xml><?xml version="1.0" encoding="utf-8"?>
 <p:sld xmlns:a="http://schemas.openxmlformats.org/drawingml/2006/main" xmlns:r="http://schemas.openxmlformats.org/officeDocument/2006/relationships" xmlns:p="http://schemas.openxmlformats.org/presentationml/2006/main">
   <p:cSld>
     <p:spTree>
@@ -5210,7 +5064,7 @@
 </p:sld>
 </file>
 
-<file path=ppt/slides/slide18.xml><?xml version="1.0" encoding="utf-8"?>
+<file path=ppt/slides/slide17.xml><?xml version="1.0" encoding="utf-8"?>
 <p:sld xmlns:a="http://schemas.openxmlformats.org/drawingml/2006/main" xmlns:r="http://schemas.openxmlformats.org/officeDocument/2006/relationships" xmlns:p="http://schemas.openxmlformats.org/presentationml/2006/main">
   <p:cSld>
     <p:spTree>
@@ -5336,7 +5190,7 @@
 </p:sld>
 </file>
 
-<file path=ppt/slides/slide19.xml><?xml version="1.0" encoding="utf-8"?>
+<file path=ppt/slides/slide18.xml><?xml version="1.0" encoding="utf-8"?>
 <p:sld xmlns:a="http://schemas.openxmlformats.org/drawingml/2006/main" xmlns:r="http://schemas.openxmlformats.org/officeDocument/2006/relationships" xmlns:p="http://schemas.openxmlformats.org/presentationml/2006/main">
   <p:cSld>
     <p:bg>
@@ -5748,7 +5602,7 @@
 </p:sld>
 </file>
 
-<file path=ppt/slides/slide2.xml><?xml version="1.0" encoding="utf-8"?>
+<file path=ppt/slides/slide19.xml><?xml version="1.0" encoding="utf-8"?>
 <p:sld xmlns:a="http://schemas.openxmlformats.org/drawingml/2006/main" xmlns:r="http://schemas.openxmlformats.org/officeDocument/2006/relationships" xmlns:p="http://schemas.openxmlformats.org/presentationml/2006/main">
   <p:cSld>
     <p:bg>
@@ -5775,7 +5629,7 @@
       </p:grpSpPr>
       <p:sp>
         <p:nvSpPr>
-          <p:cNvPr id="34" name="Rectangle 29">
+          <p:cNvPr id="15" name="Rectangle 14">
             <a:extLst>
               <a:ext uri="{FF2B5EF4-FFF2-40B4-BE49-F238E27FC236}">
                 <a16:creationId xmlns:a16="http://schemas.microsoft.com/office/drawing/2014/main" id="{6753252F-4873-4F63-801D-CC719279A7D5}"/>
@@ -5832,7 +5686,281 @@
           <a:lstStyle/>
           <a:p>
             <a:pPr algn="ctr"/>
-            <a:endParaRPr lang="en-US"/>
+            <a:endParaRPr lang="en-US" dirty="0"/>
+          </a:p>
+        </p:txBody>
+      </p:sp>
+      <p:sp>
+        <p:nvSpPr>
+          <p:cNvPr id="17" name="Rectangle 16">
+            <a:extLst>
+              <a:ext uri="{FF2B5EF4-FFF2-40B4-BE49-F238E27FC236}">
+                <a16:creationId xmlns:a16="http://schemas.microsoft.com/office/drawing/2014/main" id="{047C8CCB-F95D-4249-92DD-651249D3535A}"/>
+              </a:ext>
+              <a:ext uri="{C183D7F6-B498-43B3-948B-1728B52AA6E4}">
+                <adec:decorative xmlns:adec="http://schemas.microsoft.com/office/drawing/2017/decorative" val="1"/>
+              </a:ext>
+            </a:extLst>
+          </p:cNvPr>
+          <p:cNvSpPr>
+            <a:spLocks noGrp="1" noRot="1" noChangeAspect="1" noMove="1" noResize="1" noEditPoints="1" noAdjustHandles="1" noChangeArrowheads="1" noChangeShapeType="1" noTextEdit="1"/>
+          </p:cNvSpPr>
+          <p:nvPr>
+            <p:extLst>
+              <p:ext uri="{386F3935-93C4-4BCD-93E2-E3B085C9AB24}">
+                <p16:designElem xmlns:p16="http://schemas.microsoft.com/office/powerpoint/2015/main" val="1"/>
+              </p:ext>
+            </p:extLst>
+          </p:nvPr>
+        </p:nvSpPr>
+        <p:spPr>
+          <a:xfrm>
+            <a:off x="0" y="0"/>
+            <a:ext cx="2013557" cy="6858000"/>
+          </a:xfrm>
+          <a:prstGeom prst="rect">
+            <a:avLst/>
+          </a:prstGeom>
+          <a:solidFill>
+            <a:srgbClr val="7F7F7F"/>
+          </a:solidFill>
+          <a:ln>
+            <a:noFill/>
+          </a:ln>
+        </p:spPr>
+        <p:style>
+          <a:lnRef idx="2">
+            <a:schemeClr val="accent1">
+              <a:shade val="50000"/>
+            </a:schemeClr>
+          </a:lnRef>
+          <a:fillRef idx="1">
+            <a:schemeClr val="accent1"/>
+          </a:fillRef>
+          <a:effectRef idx="0">
+            <a:schemeClr val="accent1"/>
+          </a:effectRef>
+          <a:fontRef idx="minor">
+            <a:schemeClr val="lt1"/>
+          </a:fontRef>
+        </p:style>
+        <p:txBody>
+          <a:bodyPr rtlCol="0" anchor="ctr"/>
+          <a:lstStyle/>
+          <a:p>
+            <a:pPr algn="ctr"/>
+            <a:endParaRPr lang="en-US" dirty="0"/>
+          </a:p>
+        </p:txBody>
+      </p:sp>
+      <p:pic>
+        <p:nvPicPr>
+          <p:cNvPr id="9" name="Content Placeholder 8" descr="A picture containing screenshot&#10;&#10;Description generated with high confidence">
+            <a:extLst>
+              <a:ext uri="{FF2B5EF4-FFF2-40B4-BE49-F238E27FC236}">
+                <a16:creationId xmlns:a16="http://schemas.microsoft.com/office/drawing/2014/main" id="{AFA8F956-BD50-4021-9159-4D3FC79CB2EE}"/>
+              </a:ext>
+            </a:extLst>
+          </p:cNvPr>
+          <p:cNvPicPr>
+            <a:picLocks noGrp="1" noChangeAspect="1"/>
+          </p:cNvPicPr>
+          <p:nvPr>
+            <p:ph sz="half" idx="2"/>
+          </p:nvPr>
+        </p:nvPicPr>
+        <p:blipFill>
+          <a:blip r:embed="rId3">
+            <a:extLst>
+              <a:ext uri="{28A0092B-C50C-407E-A947-70E740481C1C}">
+                <a14:useLocalDpi xmlns:a14="http://schemas.microsoft.com/office/drawing/2010/main" val="0"/>
+              </a:ext>
+            </a:extLst>
+          </a:blip>
+          <a:stretch>
+            <a:fillRect/>
+          </a:stretch>
+        </p:blipFill>
+        <p:spPr>
+          <a:xfrm>
+            <a:off x="3211855" y="212780"/>
+            <a:ext cx="8340065" cy="6255048"/>
+          </a:xfrm>
+          <a:prstGeom prst="rect">
+            <a:avLst/>
+          </a:prstGeom>
+        </p:spPr>
+      </p:pic>
+      <p:sp>
+        <p:nvSpPr>
+          <p:cNvPr id="10" name="TextBox 9">
+            <a:extLst>
+              <a:ext uri="{FF2B5EF4-FFF2-40B4-BE49-F238E27FC236}">
+                <a16:creationId xmlns:a16="http://schemas.microsoft.com/office/drawing/2014/main" id="{6381402B-BF1C-4B3C-A7E8-1C814E1B21AE}"/>
+              </a:ext>
+            </a:extLst>
+          </p:cNvPr>
+          <p:cNvSpPr txBox="1"/>
+          <p:nvPr/>
+        </p:nvSpPr>
+        <p:spPr>
+          <a:xfrm>
+            <a:off x="640080" y="2074363"/>
+            <a:ext cx="2752354" cy="2709275"/>
+          </a:xfrm>
+          <a:prstGeom prst="ellipse">
+            <a:avLst/>
+          </a:prstGeom>
+          <a:solidFill>
+            <a:srgbClr val="262626"/>
+          </a:solidFill>
+          <a:ln w="174625" cmpd="thinThick">
+            <a:solidFill>
+              <a:srgbClr val="262626"/>
+            </a:solidFill>
+          </a:ln>
+        </p:spPr>
+        <p:txBody>
+          <a:bodyPr vert="horz" lIns="91440" tIns="45720" rIns="91440" bIns="45720" rtlCol="0" anchor="ctr">
+            <a:normAutofit/>
+          </a:bodyPr>
+          <a:lstStyle/>
+          <a:p>
+            <a:pPr algn="ctr">
+              <a:lnSpc>
+                <a:spcPct val="90000"/>
+              </a:lnSpc>
+              <a:spcBef>
+                <a:spcPct val="0"/>
+              </a:spcBef>
+              <a:spcAft>
+                <a:spcPts val="600"/>
+              </a:spcAft>
+            </a:pPr>
+            <a:r>
+              <a:rPr lang="en-US" sz="2400" b="1" kern="1200" dirty="0">
+                <a:solidFill>
+                  <a:srgbClr val="FFFFFF"/>
+                </a:solidFill>
+                <a:latin typeface="+mj-lt"/>
+                <a:ea typeface="+mj-ea"/>
+                <a:cs typeface="+mj-cs"/>
+              </a:rPr>
+              <a:t>Demographic Predictors Compared to Baseline (Good Health)</a:t>
+            </a:r>
+          </a:p>
+        </p:txBody>
+      </p:sp>
+    </p:spTree>
+    <p:extLst>
+      <p:ext uri="{BB962C8B-B14F-4D97-AF65-F5344CB8AC3E}">
+        <p14:creationId xmlns:p14="http://schemas.microsoft.com/office/powerpoint/2010/main" val="1128308462"/>
+      </p:ext>
+    </p:extLst>
+  </p:cSld>
+  <p:clrMapOvr>
+    <a:masterClrMapping/>
+  </p:clrMapOvr>
+  <mc:AlternateContent xmlns:mc="http://schemas.openxmlformats.org/markup-compatibility/2006" xmlns:p159="http://schemas.microsoft.com/office/powerpoint/2015/09/main">
+    <mc:Choice Requires="p159">
+      <p:transition xmlns:p14="http://schemas.microsoft.com/office/powerpoint/2010/main" spd="slow" p14:dur="2000">
+        <p159:morph option="byObject"/>
+      </p:transition>
+    </mc:Choice>
+    <mc:Fallback xmlns="">
+      <p:transition spd="slow">
+        <p:fade/>
+      </p:transition>
+    </mc:Fallback>
+  </mc:AlternateContent>
+</p:sld>
+</file>
+
+<file path=ppt/slides/slide2.xml><?xml version="1.0" encoding="utf-8"?>
+<p:sld xmlns:a="http://schemas.openxmlformats.org/drawingml/2006/main" xmlns:r="http://schemas.openxmlformats.org/officeDocument/2006/relationships" xmlns:p="http://schemas.openxmlformats.org/presentationml/2006/main">
+  <p:cSld>
+    <p:bg>
+      <p:bgPr>
+        <a:solidFill>
+          <a:schemeClr val="bg1"/>
+        </a:solidFill>
+        <a:effectLst/>
+      </p:bgPr>
+    </p:bg>
+    <p:spTree>
+      <p:nvGrpSpPr>
+        <p:cNvPr id="1" name=""/>
+        <p:cNvGrpSpPr/>
+        <p:nvPr/>
+      </p:nvGrpSpPr>
+      <p:grpSpPr>
+        <a:xfrm>
+          <a:off x="0" y="0"/>
+          <a:ext cx="0" cy="0"/>
+          <a:chOff x="0" y="0"/>
+          <a:chExt cx="0" cy="0"/>
+        </a:xfrm>
+      </p:grpSpPr>
+      <p:sp>
+        <p:nvSpPr>
+          <p:cNvPr id="34" name="Rectangle 29">
+            <a:extLst>
+              <a:ext uri="{FF2B5EF4-FFF2-40B4-BE49-F238E27FC236}">
+                <a16:creationId xmlns:a16="http://schemas.microsoft.com/office/drawing/2014/main" id="{6753252F-4873-4F63-801D-CC719279A7D5}"/>
+              </a:ext>
+              <a:ext uri="{C183D7F6-B498-43B3-948B-1728B52AA6E4}">
+                <adec:decorative xmlns:adec="http://schemas.microsoft.com/office/drawing/2017/decorative" val="1"/>
+              </a:ext>
+            </a:extLst>
+          </p:cNvPr>
+          <p:cNvSpPr>
+            <a:spLocks noGrp="1" noRot="1" noChangeAspect="1" noMove="1" noResize="1" noEditPoints="1" noAdjustHandles="1" noChangeArrowheads="1" noChangeShapeType="1" noTextEdit="1"/>
+          </p:cNvSpPr>
+          <p:nvPr>
+            <p:extLst>
+              <p:ext uri="{386F3935-93C4-4BCD-93E2-E3B085C9AB24}">
+                <p16:designElem xmlns:p16="http://schemas.microsoft.com/office/powerpoint/2015/main" val="1"/>
+              </p:ext>
+            </p:extLst>
+          </p:nvPr>
+        </p:nvSpPr>
+        <p:spPr>
+          <a:xfrm>
+            <a:off x="0" y="0"/>
+            <a:ext cx="12192000" cy="6858000"/>
+          </a:xfrm>
+          <a:prstGeom prst="rect">
+            <a:avLst/>
+          </a:prstGeom>
+          <a:solidFill>
+            <a:srgbClr val="FFFFFF"/>
+          </a:solidFill>
+          <a:ln>
+            <a:noFill/>
+          </a:ln>
+        </p:spPr>
+        <p:style>
+          <a:lnRef idx="2">
+            <a:schemeClr val="accent1">
+              <a:shade val="50000"/>
+            </a:schemeClr>
+          </a:lnRef>
+          <a:fillRef idx="1">
+            <a:schemeClr val="accent1"/>
+          </a:fillRef>
+          <a:effectRef idx="0">
+            <a:schemeClr val="accent1"/>
+          </a:effectRef>
+          <a:fontRef idx="minor">
+            <a:schemeClr val="lt1"/>
+          </a:fontRef>
+        </p:style>
+        <p:txBody>
+          <a:bodyPr rtlCol="0" anchor="ctr"/>
+          <a:lstStyle/>
+          <a:p>
+            <a:pPr algn="ctr"/>
+            <a:endParaRPr lang="en-US" dirty="0"/>
           </a:p>
         </p:txBody>
       </p:sp>
@@ -5895,7 +6023,7 @@
           <a:lstStyle/>
           <a:p>
             <a:pPr algn="ctr"/>
-            <a:endParaRPr lang="en-US"/>
+            <a:endParaRPr lang="en-US" dirty="0"/>
           </a:p>
         </p:txBody>
       </p:sp>
@@ -6119,7 +6247,7 @@
           <a:lstStyle/>
           <a:p>
             <a:pPr algn="ctr"/>
-            <a:endParaRPr lang="en-US"/>
+            <a:endParaRPr lang="en-US" dirty="0"/>
           </a:p>
         </p:txBody>
       </p:sp>
@@ -6182,16 +6310,16 @@
           <a:lstStyle/>
           <a:p>
             <a:pPr algn="ctr"/>
-            <a:endParaRPr lang="en-US"/>
+            <a:endParaRPr lang="en-US" dirty="0"/>
           </a:p>
         </p:txBody>
       </p:sp>
       <p:pic>
         <p:nvPicPr>
-          <p:cNvPr id="9" name="Content Placeholder 8" descr="A picture containing screenshot&#10;&#10;Description generated with high confidence">
-            <a:extLst>
-              <a:ext uri="{FF2B5EF4-FFF2-40B4-BE49-F238E27FC236}">
-                <a16:creationId xmlns:a16="http://schemas.microsoft.com/office/drawing/2014/main" id="{AFA8F956-BD50-4021-9159-4D3FC79CB2EE}"/>
+          <p:cNvPr id="6" name="Content Placeholder 5" descr="A screenshot of a cell phone&#10;&#10;Description generated with high confidence">
+            <a:extLst>
+              <a:ext uri="{FF2B5EF4-FFF2-40B4-BE49-F238E27FC236}">
+                <a16:creationId xmlns:a16="http://schemas.microsoft.com/office/drawing/2014/main" id="{CFE1C9FA-FF0B-4B05-9B4A-48E3BB2CECE5}"/>
               </a:ext>
             </a:extLst>
           </p:cNvPr>
@@ -6216,8 +6344,8 @@
         </p:blipFill>
         <p:spPr>
           <a:xfrm>
-            <a:off x="3211855" y="212780"/>
-            <a:ext cx="8340065" cy="6255048"/>
+            <a:off x="3252563" y="182093"/>
+            <a:ext cx="8299357" cy="6224517"/>
           </a:xfrm>
           <a:prstGeom prst="rect">
             <a:avLst/>
@@ -6271,7 +6399,7 @@
               </a:spcAft>
             </a:pPr>
             <a:r>
-              <a:rPr lang="en-US" sz="2400" b="1" kern="1200">
+              <a:rPr lang="en-US" sz="2200" b="1" kern="1200" dirty="0">
                 <a:solidFill>
                   <a:srgbClr val="FFFFFF"/>
                 </a:solidFill>
@@ -6279,7 +6407,7 @@
                 <a:ea typeface="+mj-ea"/>
                 <a:cs typeface="+mj-cs"/>
               </a:rPr>
-              <a:t>Demographic Predictors Compared to Baseline (Good Health)</a:t>
+              <a:t>Socio-Economic Predictors Compared to Baseline (Good Health)</a:t>
             </a:r>
           </a:p>
         </p:txBody>
@@ -6287,25 +6415,16 @@
     </p:spTree>
     <p:extLst>
       <p:ext uri="{BB962C8B-B14F-4D97-AF65-F5344CB8AC3E}">
-        <p14:creationId xmlns:p14="http://schemas.microsoft.com/office/powerpoint/2010/main" val="1128308462"/>
+        <p14:creationId xmlns:p14="http://schemas.microsoft.com/office/powerpoint/2010/main" val="3733904299"/>
       </p:ext>
     </p:extLst>
   </p:cSld>
   <p:clrMapOvr>
     <a:masterClrMapping/>
   </p:clrMapOvr>
-  <mc:AlternateContent xmlns:mc="http://schemas.openxmlformats.org/markup-compatibility/2006" xmlns:p159="http://schemas.microsoft.com/office/powerpoint/2015/09/main">
-    <mc:Choice Requires="p159">
-      <p:transition xmlns:p14="http://schemas.microsoft.com/office/powerpoint/2010/main" spd="slow" p14:dur="2000">
-        <p159:morph option="byObject"/>
-      </p:transition>
-    </mc:Choice>
-    <mc:Fallback xmlns="">
-      <p:transition spd="slow">
-        <p:fade/>
-      </p:transition>
-    </mc:Fallback>
-  </mc:AlternateContent>
+  <p:transition spd="slow">
+    <p:push dir="u"/>
+  </p:transition>
 </p:sld>
 </file>
 
@@ -6393,7 +6512,7 @@
           <a:lstStyle/>
           <a:p>
             <a:pPr algn="ctr"/>
-            <a:endParaRPr lang="en-US"/>
+            <a:endParaRPr lang="en-US" dirty="0"/>
           </a:p>
         </p:txBody>
       </p:sp>
@@ -6456,16 +6575,16 @@
           <a:lstStyle/>
           <a:p>
             <a:pPr algn="ctr"/>
-            <a:endParaRPr lang="en-US"/>
+            <a:endParaRPr lang="en-US" dirty="0"/>
           </a:p>
         </p:txBody>
       </p:sp>
       <p:pic>
         <p:nvPicPr>
-          <p:cNvPr id="6" name="Content Placeholder 5" descr="A screenshot of a cell phone&#10;&#10;Description generated with high confidence">
-            <a:extLst>
-              <a:ext uri="{FF2B5EF4-FFF2-40B4-BE49-F238E27FC236}">
-                <a16:creationId xmlns:a16="http://schemas.microsoft.com/office/drawing/2014/main" id="{CFE1C9FA-FF0B-4B05-9B4A-48E3BB2CECE5}"/>
+          <p:cNvPr id="4" name="Content Placeholder 3" descr="A screenshot of a cell phone&#10;&#10;Description generated with high confidence">
+            <a:extLst>
+              <a:ext uri="{FF2B5EF4-FFF2-40B4-BE49-F238E27FC236}">
+                <a16:creationId xmlns:a16="http://schemas.microsoft.com/office/drawing/2014/main" id="{B5B33BA5-FEC2-43F6-9081-83F924BEAAD5}"/>
               </a:ext>
             </a:extLst>
           </p:cNvPr>
@@ -6490,8 +6609,8 @@
         </p:blipFill>
         <p:spPr>
           <a:xfrm>
-            <a:off x="3252563" y="182093"/>
-            <a:ext cx="8299357" cy="6224517"/>
+            <a:off x="3050484" y="200381"/>
+            <a:ext cx="8609650" cy="6457237"/>
           </a:xfrm>
           <a:prstGeom prst="rect">
             <a:avLst/>
@@ -6545,271 +6664,6 @@
               </a:spcAft>
             </a:pPr>
             <a:r>
-              <a:rPr lang="en-US" sz="2200" b="1" kern="1200">
-                <a:solidFill>
-                  <a:srgbClr val="FFFFFF"/>
-                </a:solidFill>
-                <a:latin typeface="+mj-lt"/>
-                <a:ea typeface="+mj-ea"/>
-                <a:cs typeface="+mj-cs"/>
-              </a:rPr>
-              <a:t>Socio-Economic Predictors Compared to Baseline (Good Health)</a:t>
-            </a:r>
-          </a:p>
-        </p:txBody>
-      </p:sp>
-    </p:spTree>
-    <p:extLst>
-      <p:ext uri="{BB962C8B-B14F-4D97-AF65-F5344CB8AC3E}">
-        <p14:creationId xmlns:p14="http://schemas.microsoft.com/office/powerpoint/2010/main" val="3733904299"/>
-      </p:ext>
-    </p:extLst>
-  </p:cSld>
-  <p:clrMapOvr>
-    <a:masterClrMapping/>
-  </p:clrMapOvr>
-  <p:transition spd="slow">
-    <p:push dir="u"/>
-  </p:transition>
-</p:sld>
-</file>
-
-<file path=ppt/slides/slide22.xml><?xml version="1.0" encoding="utf-8"?>
-<p:sld xmlns:a="http://schemas.openxmlformats.org/drawingml/2006/main" xmlns:r="http://schemas.openxmlformats.org/officeDocument/2006/relationships" xmlns:p="http://schemas.openxmlformats.org/presentationml/2006/main">
-  <p:cSld>
-    <p:bg>
-      <p:bgPr>
-        <a:solidFill>
-          <a:schemeClr val="bg1"/>
-        </a:solidFill>
-        <a:effectLst/>
-      </p:bgPr>
-    </p:bg>
-    <p:spTree>
-      <p:nvGrpSpPr>
-        <p:cNvPr id="1" name=""/>
-        <p:cNvGrpSpPr/>
-        <p:nvPr/>
-      </p:nvGrpSpPr>
-      <p:grpSpPr>
-        <a:xfrm>
-          <a:off x="0" y="0"/>
-          <a:ext cx="0" cy="0"/>
-          <a:chOff x="0" y="0"/>
-          <a:chExt cx="0" cy="0"/>
-        </a:xfrm>
-      </p:grpSpPr>
-      <p:sp>
-        <p:nvSpPr>
-          <p:cNvPr id="15" name="Rectangle 14">
-            <a:extLst>
-              <a:ext uri="{FF2B5EF4-FFF2-40B4-BE49-F238E27FC236}">
-                <a16:creationId xmlns:a16="http://schemas.microsoft.com/office/drawing/2014/main" id="{6753252F-4873-4F63-801D-CC719279A7D5}"/>
-              </a:ext>
-              <a:ext uri="{C183D7F6-B498-43B3-948B-1728B52AA6E4}">
-                <adec:decorative xmlns:adec="http://schemas.microsoft.com/office/drawing/2017/decorative" val="1"/>
-              </a:ext>
-            </a:extLst>
-          </p:cNvPr>
-          <p:cNvSpPr>
-            <a:spLocks noGrp="1" noRot="1" noChangeAspect="1" noMove="1" noResize="1" noEditPoints="1" noAdjustHandles="1" noChangeArrowheads="1" noChangeShapeType="1" noTextEdit="1"/>
-          </p:cNvSpPr>
-          <p:nvPr>
-            <p:extLst>
-              <p:ext uri="{386F3935-93C4-4BCD-93E2-E3B085C9AB24}">
-                <p16:designElem xmlns:p16="http://schemas.microsoft.com/office/powerpoint/2015/main" val="1"/>
-              </p:ext>
-            </p:extLst>
-          </p:nvPr>
-        </p:nvSpPr>
-        <p:spPr>
-          <a:xfrm>
-            <a:off x="0" y="0"/>
-            <a:ext cx="12192000" cy="6858000"/>
-          </a:xfrm>
-          <a:prstGeom prst="rect">
-            <a:avLst/>
-          </a:prstGeom>
-          <a:solidFill>
-            <a:srgbClr val="FFFFFF"/>
-          </a:solidFill>
-          <a:ln>
-            <a:noFill/>
-          </a:ln>
-        </p:spPr>
-        <p:style>
-          <a:lnRef idx="2">
-            <a:schemeClr val="accent1">
-              <a:shade val="50000"/>
-            </a:schemeClr>
-          </a:lnRef>
-          <a:fillRef idx="1">
-            <a:schemeClr val="accent1"/>
-          </a:fillRef>
-          <a:effectRef idx="0">
-            <a:schemeClr val="accent1"/>
-          </a:effectRef>
-          <a:fontRef idx="minor">
-            <a:schemeClr val="lt1"/>
-          </a:fontRef>
-        </p:style>
-        <p:txBody>
-          <a:bodyPr rtlCol="0" anchor="ctr"/>
-          <a:lstStyle/>
-          <a:p>
-            <a:pPr algn="ctr"/>
-            <a:endParaRPr lang="en-US"/>
-          </a:p>
-        </p:txBody>
-      </p:sp>
-      <p:sp>
-        <p:nvSpPr>
-          <p:cNvPr id="17" name="Rectangle 16">
-            <a:extLst>
-              <a:ext uri="{FF2B5EF4-FFF2-40B4-BE49-F238E27FC236}">
-                <a16:creationId xmlns:a16="http://schemas.microsoft.com/office/drawing/2014/main" id="{047C8CCB-F95D-4249-92DD-651249D3535A}"/>
-              </a:ext>
-              <a:ext uri="{C183D7F6-B498-43B3-948B-1728B52AA6E4}">
-                <adec:decorative xmlns:adec="http://schemas.microsoft.com/office/drawing/2017/decorative" val="1"/>
-              </a:ext>
-            </a:extLst>
-          </p:cNvPr>
-          <p:cNvSpPr>
-            <a:spLocks noGrp="1" noRot="1" noChangeAspect="1" noMove="1" noResize="1" noEditPoints="1" noAdjustHandles="1" noChangeArrowheads="1" noChangeShapeType="1" noTextEdit="1"/>
-          </p:cNvSpPr>
-          <p:nvPr>
-            <p:extLst>
-              <p:ext uri="{386F3935-93C4-4BCD-93E2-E3B085C9AB24}">
-                <p16:designElem xmlns:p16="http://schemas.microsoft.com/office/powerpoint/2015/main" val="1"/>
-              </p:ext>
-            </p:extLst>
-          </p:nvPr>
-        </p:nvSpPr>
-        <p:spPr>
-          <a:xfrm>
-            <a:off x="0" y="0"/>
-            <a:ext cx="2013557" cy="6858000"/>
-          </a:xfrm>
-          <a:prstGeom prst="rect">
-            <a:avLst/>
-          </a:prstGeom>
-          <a:solidFill>
-            <a:srgbClr val="7F7F7F"/>
-          </a:solidFill>
-          <a:ln>
-            <a:noFill/>
-          </a:ln>
-        </p:spPr>
-        <p:style>
-          <a:lnRef idx="2">
-            <a:schemeClr val="accent1">
-              <a:shade val="50000"/>
-            </a:schemeClr>
-          </a:lnRef>
-          <a:fillRef idx="1">
-            <a:schemeClr val="accent1"/>
-          </a:fillRef>
-          <a:effectRef idx="0">
-            <a:schemeClr val="accent1"/>
-          </a:effectRef>
-          <a:fontRef idx="minor">
-            <a:schemeClr val="lt1"/>
-          </a:fontRef>
-        </p:style>
-        <p:txBody>
-          <a:bodyPr rtlCol="0" anchor="ctr"/>
-          <a:lstStyle/>
-          <a:p>
-            <a:pPr algn="ctr"/>
-            <a:endParaRPr lang="en-US"/>
-          </a:p>
-        </p:txBody>
-      </p:sp>
-      <p:pic>
-        <p:nvPicPr>
-          <p:cNvPr id="4" name="Content Placeholder 3" descr="A screenshot of a cell phone&#10;&#10;Description generated with high confidence">
-            <a:extLst>
-              <a:ext uri="{FF2B5EF4-FFF2-40B4-BE49-F238E27FC236}">
-                <a16:creationId xmlns:a16="http://schemas.microsoft.com/office/drawing/2014/main" id="{B5B33BA5-FEC2-43F6-9081-83F924BEAAD5}"/>
-              </a:ext>
-            </a:extLst>
-          </p:cNvPr>
-          <p:cNvPicPr>
-            <a:picLocks noGrp="1" noChangeAspect="1"/>
-          </p:cNvPicPr>
-          <p:nvPr>
-            <p:ph sz="half" idx="2"/>
-          </p:nvPr>
-        </p:nvPicPr>
-        <p:blipFill>
-          <a:blip r:embed="rId3">
-            <a:extLst>
-              <a:ext uri="{28A0092B-C50C-407E-A947-70E740481C1C}">
-                <a14:useLocalDpi xmlns:a14="http://schemas.microsoft.com/office/drawing/2010/main" val="0"/>
-              </a:ext>
-            </a:extLst>
-          </a:blip>
-          <a:stretch>
-            <a:fillRect/>
-          </a:stretch>
-        </p:blipFill>
-        <p:spPr>
-          <a:xfrm>
-            <a:off x="3050484" y="200381"/>
-            <a:ext cx="8609650" cy="6457237"/>
-          </a:xfrm>
-          <a:prstGeom prst="rect">
-            <a:avLst/>
-          </a:prstGeom>
-        </p:spPr>
-      </p:pic>
-      <p:sp>
-        <p:nvSpPr>
-          <p:cNvPr id="10" name="TextBox 9">
-            <a:extLst>
-              <a:ext uri="{FF2B5EF4-FFF2-40B4-BE49-F238E27FC236}">
-                <a16:creationId xmlns:a16="http://schemas.microsoft.com/office/drawing/2014/main" id="{6381402B-BF1C-4B3C-A7E8-1C814E1B21AE}"/>
-              </a:ext>
-            </a:extLst>
-          </p:cNvPr>
-          <p:cNvSpPr txBox="1"/>
-          <p:nvPr/>
-        </p:nvSpPr>
-        <p:spPr>
-          <a:xfrm>
-            <a:off x="640080" y="2074363"/>
-            <a:ext cx="2752354" cy="2709275"/>
-          </a:xfrm>
-          <a:prstGeom prst="ellipse">
-            <a:avLst/>
-          </a:prstGeom>
-          <a:solidFill>
-            <a:srgbClr val="262626"/>
-          </a:solidFill>
-          <a:ln w="174625" cmpd="thinThick">
-            <a:solidFill>
-              <a:srgbClr val="262626"/>
-            </a:solidFill>
-          </a:ln>
-        </p:spPr>
-        <p:txBody>
-          <a:bodyPr vert="horz" lIns="91440" tIns="45720" rIns="91440" bIns="45720" rtlCol="0" anchor="ctr">
-            <a:normAutofit/>
-          </a:bodyPr>
-          <a:lstStyle/>
-          <a:p>
-            <a:pPr algn="ctr">
-              <a:lnSpc>
-                <a:spcPct val="90000"/>
-              </a:lnSpc>
-              <a:spcBef>
-                <a:spcPct val="0"/>
-              </a:spcBef>
-              <a:spcAft>
-                <a:spcPts val="600"/>
-              </a:spcAft>
-            </a:pPr>
-            <a:r>
               <a:rPr lang="en-US" sz="2400" b="1" kern="1200" dirty="0">
                 <a:solidFill>
                   <a:srgbClr val="FFFFFF"/>
@@ -6839,7 +6693,7 @@
 </p:sld>
 </file>
 
-<file path=ppt/slides/slide23.xml><?xml version="1.0" encoding="utf-8"?>
+<file path=ppt/slides/slide22.xml><?xml version="1.0" encoding="utf-8"?>
 <p:sld xmlns:a="http://schemas.openxmlformats.org/drawingml/2006/main" xmlns:r="http://schemas.openxmlformats.org/officeDocument/2006/relationships" xmlns:p="http://schemas.openxmlformats.org/presentationml/2006/main">
   <p:cSld>
     <p:bg>
@@ -6924,7 +6778,7 @@
 </p:sld>
 </file>
 
-<file path=ppt/slides/slide24.xml><?xml version="1.0" encoding="utf-8"?>
+<file path=ppt/slides/slide23.xml><?xml version="1.0" encoding="utf-8"?>
 <p:sld xmlns:a="http://schemas.openxmlformats.org/drawingml/2006/main" xmlns:r="http://schemas.openxmlformats.org/officeDocument/2006/relationships" xmlns:p="http://schemas.openxmlformats.org/presentationml/2006/main">
   <p:cSld>
     <p:spTree>
@@ -7085,7 +6939,7 @@
           <a:lstStyle/>
           <a:p>
             <a:pPr algn="ctr"/>
-            <a:endParaRPr lang="en-US"/>
+            <a:endParaRPr lang="en-US" dirty="0"/>
           </a:p>
         </p:txBody>
       </p:sp>
@@ -7965,7 +7819,7 @@
           <a:lstStyle/>
           <a:p>
             <a:pPr algn="ctr"/>
-            <a:endParaRPr lang="en-US"/>
+            <a:endParaRPr lang="en-US" dirty="0"/>
           </a:p>
         </p:txBody>
       </p:sp>
@@ -8275,7 +8129,7 @@
           <a:lstStyle/>
           <a:p>
             <a:pPr algn="ctr"/>
-            <a:endParaRPr lang="en-US"/>
+            <a:endParaRPr lang="en-US" dirty="0"/>
           </a:p>
         </p:txBody>
       </p:sp>
@@ -8369,21 +8223,8 @@
                   <a:schemeClr val="accent1"/>
                 </a:solidFill>
               </a:rPr>
-              <a:t>Exploration of our </a:t>
-            </a:r>
-            <a:r>
-              <a:rPr lang="en-US" dirty="0" err="1">
-                <a:solidFill>
-                  <a:schemeClr val="accent1"/>
-                </a:solidFill>
-              </a:rPr>
-              <a:t>DataSet</a:t>
-            </a:r>
-            <a:endParaRPr lang="en-US" dirty="0">
-              <a:solidFill>
-                <a:schemeClr val="accent1"/>
-              </a:solidFill>
-            </a:endParaRPr>
+              <a:t>Exploration of our Dataset</a:t>
+            </a:r>
           </a:p>
         </p:txBody>
       </p:sp>
@@ -8417,15 +8258,7 @@
           <a:p>
             <a:r>
               <a:rPr lang="en-US" sz="2400" dirty="0"/>
-              <a:t>Challenges with the </a:t>
-            </a:r>
-            <a:r>
-              <a:rPr lang="en-US" sz="2400" dirty="0" err="1"/>
-              <a:t>DataSet</a:t>
-            </a:r>
-            <a:r>
-              <a:rPr lang="en-US" sz="2400" dirty="0"/>
-              <a:t>…</a:t>
+              <a:t>Challenges with the Dataset…</a:t>
             </a:r>
           </a:p>
           <a:p>
@@ -8480,13 +8313,8 @@
             <a:pPr lvl="1"/>
             <a:r>
               <a:rPr lang="en-US" dirty="0"/>
-              <a:t>Created complete </a:t>
-            </a:r>
-            <a:r>
-              <a:rPr lang="en-US" dirty="0" err="1"/>
-              <a:t>DataSet</a:t>
-            </a:r>
-            <a:endParaRPr lang="en-US" dirty="0"/>
+              <a:t>Created complete Dataset</a:t>
+            </a:r>
           </a:p>
           <a:p>
             <a:pPr lvl="2"/>
@@ -9382,10 +9210,9 @@
           <a:lstStyle/>
           <a:p>
             <a:r>
-              <a:rPr lang="en-US"/>
+              <a:rPr lang="en-US" dirty="0"/>
               <a:t>Age Group</a:t>
             </a:r>
-            <a:endParaRPr lang="en-US" dirty="0"/>
           </a:p>
         </p:txBody>
       </p:sp>
@@ -9416,13 +9243,13 @@
           <a:lstStyle/>
           <a:p>
             <a:r>
-              <a:rPr lang="en-US"/>
+              <a:rPr lang="en-US" dirty="0"/>
               <a:t>Age distribution is proportionally similar across all health categories.</a:t>
             </a:r>
           </a:p>
           <a:p>
             <a:r>
-              <a:rPr lang="en-US"/>
+              <a:rPr lang="en-US" dirty="0"/>
               <a:t>There is a spike in poor health for those over 65.</a:t>
             </a:r>
           </a:p>
@@ -9520,7 +9347,7 @@
           <a:p>
             <a:r>
               <a:rPr lang="en-US" dirty="0"/>
-              <a:t>Gender by Age</a:t>
+              <a:t>Gender</a:t>
             </a:r>
           </a:p>
         </p:txBody>
@@ -9543,8 +9370,8 @@
         </p:nvSpPr>
         <p:spPr>
           <a:xfrm>
-            <a:off x="631838" y="4940640"/>
-            <a:ext cx="10454197" cy="1078021"/>
+            <a:off x="7605616" y="1250576"/>
+            <a:ext cx="3890348" cy="5122928"/>
           </a:xfrm>
         </p:spPr>
         <p:txBody>
@@ -9554,18 +9381,18 @@
           <a:lstStyle/>
           <a:p>
             <a:r>
-              <a:rPr lang="en-US" sz="1600" dirty="0"/>
-              <a:t>Millennials vs. Baby Boomers</a:t>
+              <a:rPr lang="en-US" dirty="0"/>
+              <a:t>Genders were proportionally similar across the health categories</a:t>
             </a:r>
           </a:p>
         </p:txBody>
       </p:sp>
       <p:pic>
         <p:nvPicPr>
-          <p:cNvPr id="3" name="Picture 2">
-            <a:extLst>
-              <a:ext uri="{FF2B5EF4-FFF2-40B4-BE49-F238E27FC236}">
-                <a16:creationId xmlns:a16="http://schemas.microsoft.com/office/drawing/2014/main" id="{FC339BFC-199B-426D-9DBF-6CF9CCFB20AF}"/>
+          <p:cNvPr id="6" name="Picture 5">
+            <a:extLst>
+              <a:ext uri="{FF2B5EF4-FFF2-40B4-BE49-F238E27FC236}">
+                <a16:creationId xmlns:a16="http://schemas.microsoft.com/office/drawing/2014/main" id="{B0454BE3-76B4-4EFE-8D6F-A6536E75BD29}"/>
               </a:ext>
             </a:extLst>
           </p:cNvPr>
@@ -9588,52 +9415,8 @@
         </p:blipFill>
         <p:spPr>
           <a:xfrm>
-            <a:off x="631838" y="1141394"/>
-            <a:ext cx="5140983" cy="3662618"/>
-          </a:xfrm>
-          <a:prstGeom prst="rect">
-            <a:avLst/>
-          </a:prstGeom>
-          <a:ln w="12700">
-            <a:solidFill>
-              <a:schemeClr val="bg1">
-                <a:lumMod val="50000"/>
-              </a:schemeClr>
-            </a:solidFill>
-            <a:prstDash val="sysDot"/>
-          </a:ln>
-        </p:spPr>
-      </p:pic>
-      <p:pic>
-        <p:nvPicPr>
-          <p:cNvPr id="5" name="Picture 4">
-            <a:extLst>
-              <a:ext uri="{FF2B5EF4-FFF2-40B4-BE49-F238E27FC236}">
-                <a16:creationId xmlns:a16="http://schemas.microsoft.com/office/drawing/2014/main" id="{051D652D-617F-4D3F-B50C-DB8BDF65194C}"/>
-              </a:ext>
-            </a:extLst>
-          </p:cNvPr>
-          <p:cNvPicPr>
-            <a:picLocks noChangeAspect="1"/>
-          </p:cNvPicPr>
-          <p:nvPr/>
-        </p:nvPicPr>
-        <p:blipFill>
-          <a:blip r:embed="rId3">
-            <a:extLst>
-              <a:ext uri="{28A0092B-C50C-407E-A947-70E740481C1C}">
-                <a14:useLocalDpi xmlns:a14="http://schemas.microsoft.com/office/drawing/2010/main" val="0"/>
-              </a:ext>
-            </a:extLst>
-          </a:blip>
-          <a:stretch>
-            <a:fillRect/>
-          </a:stretch>
-        </p:blipFill>
-        <p:spPr>
-          <a:xfrm>
-            <a:off x="5945052" y="1141394"/>
-            <a:ext cx="5140983" cy="3662618"/>
+            <a:off x="686201" y="1250576"/>
+            <a:ext cx="6400800" cy="4686301"/>
           </a:xfrm>
           <a:prstGeom prst="rect">
             <a:avLst/>
@@ -9651,7 +9434,7 @@
     </p:spTree>
     <p:extLst>
       <p:ext uri="{BB962C8B-B14F-4D97-AF65-F5344CB8AC3E}">
-        <p14:creationId xmlns:p14="http://schemas.microsoft.com/office/powerpoint/2010/main" val="3880508328"/>
+        <p14:creationId xmlns:p14="http://schemas.microsoft.com/office/powerpoint/2010/main" val="1192343992"/>
       </p:ext>
     </p:extLst>
   </p:cSld>

</xml_diff>